<commit_message>
edit tests (1-43) + edit report
</commit_message>
<xml_diff>
--- a/Длинная арифметика.pptx
+++ b/Длинная арифметика.pptx
@@ -266,7 +266,7 @@
           <a:p>
             <a:fld id="{7180E4FB-2FC9-4BFA-B8DE-F3C32A3D4E30}" type="datetimeFigureOut">
               <a:rPr lang="ru-RU" smtClean="0"/>
-              <a:t>10.12.2022</a:t>
+              <a:t>13.12.2022</a:t>
             </a:fld>
             <a:endParaRPr lang="ru-RU"/>
           </a:p>
@@ -464,7 +464,7 @@
           <a:p>
             <a:fld id="{7180E4FB-2FC9-4BFA-B8DE-F3C32A3D4E30}" type="datetimeFigureOut">
               <a:rPr lang="ru-RU" smtClean="0"/>
-              <a:t>10.12.2022</a:t>
+              <a:t>13.12.2022</a:t>
             </a:fld>
             <a:endParaRPr lang="ru-RU"/>
           </a:p>
@@ -672,7 +672,7 @@
           <a:p>
             <a:fld id="{7180E4FB-2FC9-4BFA-B8DE-F3C32A3D4E30}" type="datetimeFigureOut">
               <a:rPr lang="ru-RU" smtClean="0"/>
-              <a:t>10.12.2022</a:t>
+              <a:t>13.12.2022</a:t>
             </a:fld>
             <a:endParaRPr lang="ru-RU"/>
           </a:p>
@@ -870,7 +870,7 @@
           <a:p>
             <a:fld id="{7180E4FB-2FC9-4BFA-B8DE-F3C32A3D4E30}" type="datetimeFigureOut">
               <a:rPr lang="ru-RU" smtClean="0"/>
-              <a:t>10.12.2022</a:t>
+              <a:t>13.12.2022</a:t>
             </a:fld>
             <a:endParaRPr lang="ru-RU"/>
           </a:p>
@@ -1145,7 +1145,7 @@
           <a:p>
             <a:fld id="{7180E4FB-2FC9-4BFA-B8DE-F3C32A3D4E30}" type="datetimeFigureOut">
               <a:rPr lang="ru-RU" smtClean="0"/>
-              <a:t>10.12.2022</a:t>
+              <a:t>13.12.2022</a:t>
             </a:fld>
             <a:endParaRPr lang="ru-RU"/>
           </a:p>
@@ -1410,7 +1410,7 @@
           <a:p>
             <a:fld id="{7180E4FB-2FC9-4BFA-B8DE-F3C32A3D4E30}" type="datetimeFigureOut">
               <a:rPr lang="ru-RU" smtClean="0"/>
-              <a:t>10.12.2022</a:t>
+              <a:t>13.12.2022</a:t>
             </a:fld>
             <a:endParaRPr lang="ru-RU"/>
           </a:p>
@@ -1822,7 +1822,7 @@
           <a:p>
             <a:fld id="{7180E4FB-2FC9-4BFA-B8DE-F3C32A3D4E30}" type="datetimeFigureOut">
               <a:rPr lang="ru-RU" smtClean="0"/>
-              <a:t>10.12.2022</a:t>
+              <a:t>13.12.2022</a:t>
             </a:fld>
             <a:endParaRPr lang="ru-RU"/>
           </a:p>
@@ -1963,7 +1963,7 @@
           <a:p>
             <a:fld id="{7180E4FB-2FC9-4BFA-B8DE-F3C32A3D4E30}" type="datetimeFigureOut">
               <a:rPr lang="ru-RU" smtClean="0"/>
-              <a:t>10.12.2022</a:t>
+              <a:t>13.12.2022</a:t>
             </a:fld>
             <a:endParaRPr lang="ru-RU"/>
           </a:p>
@@ -2076,7 +2076,7 @@
           <a:p>
             <a:fld id="{7180E4FB-2FC9-4BFA-B8DE-F3C32A3D4E30}" type="datetimeFigureOut">
               <a:rPr lang="ru-RU" smtClean="0"/>
-              <a:t>10.12.2022</a:t>
+              <a:t>13.12.2022</a:t>
             </a:fld>
             <a:endParaRPr lang="ru-RU"/>
           </a:p>
@@ -2387,7 +2387,7 @@
           <a:p>
             <a:fld id="{7180E4FB-2FC9-4BFA-B8DE-F3C32A3D4E30}" type="datetimeFigureOut">
               <a:rPr lang="ru-RU" smtClean="0"/>
-              <a:t>10.12.2022</a:t>
+              <a:t>13.12.2022</a:t>
             </a:fld>
             <a:endParaRPr lang="ru-RU"/>
           </a:p>
@@ -2675,7 +2675,7 @@
           <a:p>
             <a:fld id="{7180E4FB-2FC9-4BFA-B8DE-F3C32A3D4E30}" type="datetimeFigureOut">
               <a:rPr lang="ru-RU" smtClean="0"/>
-              <a:t>10.12.2022</a:t>
+              <a:t>13.12.2022</a:t>
             </a:fld>
             <a:endParaRPr lang="ru-RU"/>
           </a:p>
@@ -2752,9 +2752,29 @@
 <p:sldMaster xmlns:a="http://schemas.openxmlformats.org/drawingml/2006/main" xmlns:r="http://schemas.openxmlformats.org/officeDocument/2006/relationships" xmlns:p="http://schemas.openxmlformats.org/presentationml/2006/main">
   <p:cSld>
     <p:bg>
-      <p:bgRef idx="1001">
-        <a:schemeClr val="bg1"/>
-      </p:bgRef>
+      <p:bgPr>
+        <a:gradFill flip="none" rotWithShape="1">
+          <a:gsLst>
+            <a:gs pos="0">
+              <a:schemeClr val="accent1">
+                <a:lumMod val="5000"/>
+                <a:lumOff val="95000"/>
+              </a:schemeClr>
+            </a:gs>
+            <a:gs pos="74000">
+              <a:srgbClr val="EADFD6"/>
+            </a:gs>
+            <a:gs pos="100000">
+              <a:srgbClr val="CCAF9B"/>
+            </a:gs>
+          </a:gsLst>
+          <a:path path="circle">
+            <a:fillToRect l="100000" t="100000"/>
+          </a:path>
+          <a:tileRect r="-100000" b="-100000"/>
+        </a:gradFill>
+        <a:effectLst/>
+      </p:bgPr>
     </p:bg>
     <p:spTree>
       <p:nvGrpSpPr>
@@ -2916,7 +2936,7 @@
           <a:p>
             <a:fld id="{7180E4FB-2FC9-4BFA-B8DE-F3C32A3D4E30}" type="datetimeFigureOut">
               <a:rPr lang="ru-RU" smtClean="0"/>
-              <a:t>10.12.2022</a:t>
+              <a:t>13.12.2022</a:t>
             </a:fld>
             <a:endParaRPr lang="ru-RU"/>
           </a:p>
@@ -3349,9 +3369,16 @@
             <p:ph type="ctrTitle"/>
           </p:nvPr>
         </p:nvSpPr>
-        <p:spPr/>
-        <p:txBody>
-          <a:bodyPr/>
+        <p:spPr>
+          <a:xfrm>
+            <a:off x="2063650" y="2572792"/>
+            <a:ext cx="7289381" cy="943329"/>
+          </a:xfrm>
+        </p:spPr>
+        <p:txBody>
+          <a:bodyPr>
+            <a:normAutofit/>
+          </a:bodyPr>
           <a:lstStyle/>
           <a:p>
             <a:r>
@@ -3379,18 +3406,20 @@
         </p:nvSpPr>
         <p:spPr>
           <a:xfrm>
-            <a:off x="5708341" y="5263972"/>
-            <a:ext cx="6007223" cy="943329"/>
+            <a:off x="6214369" y="5263972"/>
+            <a:ext cx="5501195" cy="943329"/>
           </a:xfrm>
         </p:spPr>
         <p:txBody>
-          <a:bodyPr/>
+          <a:bodyPr>
+            <a:normAutofit fontScale="92500" lnSpcReduction="20000"/>
+          </a:bodyPr>
           <a:lstStyle/>
           <a:p>
             <a:pPr algn="r"/>
             <a:r>
               <a:rPr lang="ru-RU" dirty="0"/>
-              <a:t>Обучающийся Щербак Ирина Сергеевна</a:t>
+              <a:t>Обучающийся Щербак Ирина Сергеевна Б9121-09.03.03пикд</a:t>
             </a:r>
           </a:p>
           <a:p>
@@ -3406,6 +3435,111 @@
             <a:r>
               <a:rPr lang="ru-RU" dirty="0"/>
               <a:t> Александр Сергеевич</a:t>
+            </a:r>
+          </a:p>
+        </p:txBody>
+      </p:sp>
+      <p:sp>
+        <p:nvSpPr>
+          <p:cNvPr id="4" name="TextBox 3">
+            <a:extLst>
+              <a:ext uri="{FF2B5EF4-FFF2-40B4-BE49-F238E27FC236}">
+                <a16:creationId xmlns:a16="http://schemas.microsoft.com/office/drawing/2014/main" id="{BFA96654-8AC7-4BB6-3DDC-C76C56D9214E}"/>
+              </a:ext>
+            </a:extLst>
+          </p:cNvPr>
+          <p:cNvSpPr txBox="1"/>
+          <p:nvPr/>
+        </p:nvSpPr>
+        <p:spPr>
+          <a:xfrm flipH="1">
+            <a:off x="3378618" y="287525"/>
+            <a:ext cx="4659446" cy="369332"/>
+          </a:xfrm>
+          <a:prstGeom prst="rect">
+            <a:avLst/>
+          </a:prstGeom>
+          <a:noFill/>
+        </p:spPr>
+        <p:txBody>
+          <a:bodyPr wrap="square" rtlCol="0">
+            <a:spAutoFit/>
+          </a:bodyPr>
+          <a:lstStyle/>
+          <a:p>
+            <a:r>
+              <a:rPr lang="ru-RU" dirty="0"/>
+              <a:t>Дальневосточный федеральный университет</a:t>
+            </a:r>
+          </a:p>
+        </p:txBody>
+      </p:sp>
+      <p:sp>
+        <p:nvSpPr>
+          <p:cNvPr id="5" name="TextBox 4">
+            <a:extLst>
+              <a:ext uri="{FF2B5EF4-FFF2-40B4-BE49-F238E27FC236}">
+                <a16:creationId xmlns:a16="http://schemas.microsoft.com/office/drawing/2014/main" id="{A851C680-C9C8-7686-CE6B-94E3120E7079}"/>
+              </a:ext>
+            </a:extLst>
+          </p:cNvPr>
+          <p:cNvSpPr txBox="1"/>
+          <p:nvPr/>
+        </p:nvSpPr>
+        <p:spPr>
+          <a:xfrm flipH="1">
+            <a:off x="4445826" y="2035376"/>
+            <a:ext cx="3300348" cy="369332"/>
+          </a:xfrm>
+          <a:prstGeom prst="rect">
+            <a:avLst/>
+          </a:prstGeom>
+          <a:noFill/>
+        </p:spPr>
+        <p:txBody>
+          <a:bodyPr wrap="square" rtlCol="0">
+            <a:spAutoFit/>
+          </a:bodyPr>
+          <a:lstStyle/>
+          <a:p>
+            <a:r>
+              <a:rPr lang="ru-RU" dirty="0"/>
+              <a:t>Алгоритмы и структуры данных</a:t>
+            </a:r>
+          </a:p>
+        </p:txBody>
+      </p:sp>
+      <p:sp>
+        <p:nvSpPr>
+          <p:cNvPr id="6" name="TextBox 5">
+            <a:extLst>
+              <a:ext uri="{FF2B5EF4-FFF2-40B4-BE49-F238E27FC236}">
+                <a16:creationId xmlns:a16="http://schemas.microsoft.com/office/drawing/2014/main" id="{9FDEF192-1636-E15C-DAB3-7CA830383332}"/>
+              </a:ext>
+            </a:extLst>
+          </p:cNvPr>
+          <p:cNvSpPr txBox="1"/>
+          <p:nvPr/>
+        </p:nvSpPr>
+        <p:spPr>
+          <a:xfrm>
+            <a:off x="5375427" y="6201143"/>
+            <a:ext cx="665825" cy="369332"/>
+          </a:xfrm>
+          <a:prstGeom prst="rect">
+            <a:avLst/>
+          </a:prstGeom>
+          <a:noFill/>
+        </p:spPr>
+        <p:txBody>
+          <a:bodyPr wrap="square" rtlCol="0">
+            <a:spAutoFit/>
+          </a:bodyPr>
+          <a:lstStyle/>
+          <a:p>
+            <a:r>
+              <a:rPr lang="ru-RU" dirty="0"/>
+              <a:t>2022</a:t>
             </a:r>
           </a:p>
         </p:txBody>

</xml_diff>

<commit_message>
test - update, powerpoint - update, report - update
</commit_message>
<xml_diff>
--- a/Длинная арифметика.pptx
+++ b/Длинная арифметика.pptx
@@ -1,9 +1,12 @@
 
 <file path=ppt/presentation.xml><?xml version="1.0" encoding="utf-8"?>
-<p:presentation xmlns:a="http://schemas.openxmlformats.org/drawingml/2006/main" xmlns:r="http://schemas.openxmlformats.org/officeDocument/2006/relationships" xmlns:p="http://schemas.openxmlformats.org/presentationml/2006/main" saveSubsetFonts="1">
+<p:presentation xmlns:a="http://schemas.openxmlformats.org/drawingml/2006/main" xmlns:r="http://schemas.openxmlformats.org/officeDocument/2006/relationships" xmlns:p="http://schemas.openxmlformats.org/presentationml/2006/main" showSpecialPlsOnTitleSld="0" saveSubsetFonts="1">
   <p:sldMasterIdLst>
     <p:sldMasterId id="2147483648" r:id="rId1"/>
   </p:sldMasterIdLst>
+  <p:notesMasterIdLst>
+    <p:notesMasterId r:id="rId10"/>
+  </p:notesMasterIdLst>
   <p:sldIdLst>
     <p:sldId id="256" r:id="rId2"/>
     <p:sldId id="261" r:id="rId3"/>
@@ -119,6 +122,355 @@
 </p:presentation>
 </file>
 
+<file path=ppt/notesMasters/notesMaster1.xml><?xml version="1.0" encoding="utf-8"?>
+<p:notesMaster xmlns:a="http://schemas.openxmlformats.org/drawingml/2006/main" xmlns:r="http://schemas.openxmlformats.org/officeDocument/2006/relationships" xmlns:p="http://schemas.openxmlformats.org/presentationml/2006/main">
+  <p:cSld>
+    <p:bg>
+      <p:bgRef idx="1001">
+        <a:schemeClr val="bg1"/>
+      </p:bgRef>
+    </p:bg>
+    <p:spTree>
+      <p:nvGrpSpPr>
+        <p:cNvPr id="1" name=""/>
+        <p:cNvGrpSpPr/>
+        <p:nvPr/>
+      </p:nvGrpSpPr>
+      <p:grpSpPr>
+        <a:xfrm>
+          <a:off x="0" y="0"/>
+          <a:ext cx="0" cy="0"/>
+          <a:chOff x="0" y="0"/>
+          <a:chExt cx="0" cy="0"/>
+        </a:xfrm>
+      </p:grpSpPr>
+      <p:sp>
+        <p:nvSpPr>
+          <p:cNvPr id="2" name="Верхний колонтитул 1"/>
+          <p:cNvSpPr>
+            <a:spLocks noGrp="1"/>
+          </p:cNvSpPr>
+          <p:nvPr>
+            <p:ph type="hdr" sz="quarter"/>
+          </p:nvPr>
+        </p:nvSpPr>
+        <p:spPr>
+          <a:xfrm>
+            <a:off x="0" y="0"/>
+            <a:ext cx="2971800" cy="458788"/>
+          </a:xfrm>
+          <a:prstGeom prst="rect">
+            <a:avLst/>
+          </a:prstGeom>
+        </p:spPr>
+        <p:txBody>
+          <a:bodyPr vert="horz" lIns="91440" tIns="45720" rIns="91440" bIns="45720" rtlCol="0"/>
+          <a:lstStyle>
+            <a:lvl1pPr algn="l">
+              <a:defRPr sz="1200"/>
+            </a:lvl1pPr>
+          </a:lstStyle>
+          <a:p>
+            <a:endParaRPr lang="ru-RU"/>
+          </a:p>
+        </p:txBody>
+      </p:sp>
+      <p:sp>
+        <p:nvSpPr>
+          <p:cNvPr id="3" name="Дата 2"/>
+          <p:cNvSpPr>
+            <a:spLocks noGrp="1"/>
+          </p:cNvSpPr>
+          <p:nvPr>
+            <p:ph type="dt" idx="1"/>
+          </p:nvPr>
+        </p:nvSpPr>
+        <p:spPr>
+          <a:xfrm>
+            <a:off x="3884613" y="0"/>
+            <a:ext cx="2971800" cy="458788"/>
+          </a:xfrm>
+          <a:prstGeom prst="rect">
+            <a:avLst/>
+          </a:prstGeom>
+        </p:spPr>
+        <p:txBody>
+          <a:bodyPr vert="horz" lIns="91440" tIns="45720" rIns="91440" bIns="45720" rtlCol="0"/>
+          <a:lstStyle>
+            <a:lvl1pPr algn="r">
+              <a:defRPr sz="1200"/>
+            </a:lvl1pPr>
+          </a:lstStyle>
+          <a:p>
+            <a:fld id="{0F16658D-4634-42D1-9A05-C4D2C07DBBAD}" type="datetimeFigureOut">
+              <a:rPr lang="ru-RU" smtClean="0"/>
+              <a:t>20.12.2022</a:t>
+            </a:fld>
+            <a:endParaRPr lang="ru-RU"/>
+          </a:p>
+        </p:txBody>
+      </p:sp>
+      <p:sp>
+        <p:nvSpPr>
+          <p:cNvPr id="4" name="Образ слайда 3"/>
+          <p:cNvSpPr>
+            <a:spLocks noGrp="1" noRot="1" noChangeAspect="1"/>
+          </p:cNvSpPr>
+          <p:nvPr>
+            <p:ph type="sldImg" idx="2"/>
+          </p:nvPr>
+        </p:nvSpPr>
+        <p:spPr>
+          <a:xfrm>
+            <a:off x="685800" y="1143000"/>
+            <a:ext cx="5486400" cy="3086100"/>
+          </a:xfrm>
+          <a:prstGeom prst="rect">
+            <a:avLst/>
+          </a:prstGeom>
+          <a:noFill/>
+          <a:ln w="12700">
+            <a:solidFill>
+              <a:prstClr val="black"/>
+            </a:solidFill>
+          </a:ln>
+        </p:spPr>
+        <p:txBody>
+          <a:bodyPr vert="horz" lIns="91440" tIns="45720" rIns="91440" bIns="45720" rtlCol="0" anchor="ctr"/>
+          <a:lstStyle/>
+          <a:p>
+            <a:endParaRPr lang="ru-RU"/>
+          </a:p>
+        </p:txBody>
+      </p:sp>
+      <p:sp>
+        <p:nvSpPr>
+          <p:cNvPr id="5" name="Заметки 4"/>
+          <p:cNvSpPr>
+            <a:spLocks noGrp="1"/>
+          </p:cNvSpPr>
+          <p:nvPr>
+            <p:ph type="body" sz="quarter" idx="3"/>
+          </p:nvPr>
+        </p:nvSpPr>
+        <p:spPr>
+          <a:xfrm>
+            <a:off x="685800" y="4400550"/>
+            <a:ext cx="5486400" cy="3600450"/>
+          </a:xfrm>
+          <a:prstGeom prst="rect">
+            <a:avLst/>
+          </a:prstGeom>
+        </p:spPr>
+        <p:txBody>
+          <a:bodyPr vert="horz" lIns="91440" tIns="45720" rIns="91440" bIns="45720" rtlCol="0"/>
+          <a:lstStyle/>
+          <a:p>
+            <a:pPr lvl="0"/>
+            <a:r>
+              <a:rPr lang="ru-RU"/>
+              <a:t>Образец текста</a:t>
+            </a:r>
+          </a:p>
+          <a:p>
+            <a:pPr lvl="1"/>
+            <a:r>
+              <a:rPr lang="ru-RU"/>
+              <a:t>Второй уровень</a:t>
+            </a:r>
+          </a:p>
+          <a:p>
+            <a:pPr lvl="2"/>
+            <a:r>
+              <a:rPr lang="ru-RU"/>
+              <a:t>Третий уровень</a:t>
+            </a:r>
+          </a:p>
+          <a:p>
+            <a:pPr lvl="3"/>
+            <a:r>
+              <a:rPr lang="ru-RU"/>
+              <a:t>Четвертый уровень</a:t>
+            </a:r>
+          </a:p>
+          <a:p>
+            <a:pPr lvl="4"/>
+            <a:r>
+              <a:rPr lang="ru-RU"/>
+              <a:t>Пятый уровень</a:t>
+            </a:r>
+          </a:p>
+        </p:txBody>
+      </p:sp>
+      <p:sp>
+        <p:nvSpPr>
+          <p:cNvPr id="6" name="Нижний колонтитул 5"/>
+          <p:cNvSpPr>
+            <a:spLocks noGrp="1"/>
+          </p:cNvSpPr>
+          <p:nvPr>
+            <p:ph type="ftr" sz="quarter" idx="4"/>
+          </p:nvPr>
+        </p:nvSpPr>
+        <p:spPr>
+          <a:xfrm>
+            <a:off x="0" y="8685213"/>
+            <a:ext cx="2971800" cy="458787"/>
+          </a:xfrm>
+          <a:prstGeom prst="rect">
+            <a:avLst/>
+          </a:prstGeom>
+        </p:spPr>
+        <p:txBody>
+          <a:bodyPr vert="horz" lIns="91440" tIns="45720" rIns="91440" bIns="45720" rtlCol="0" anchor="b"/>
+          <a:lstStyle>
+            <a:lvl1pPr algn="l">
+              <a:defRPr sz="1200"/>
+            </a:lvl1pPr>
+          </a:lstStyle>
+          <a:p>
+            <a:endParaRPr lang="ru-RU"/>
+          </a:p>
+        </p:txBody>
+      </p:sp>
+      <p:sp>
+        <p:nvSpPr>
+          <p:cNvPr id="7" name="Номер слайда 6"/>
+          <p:cNvSpPr>
+            <a:spLocks noGrp="1"/>
+          </p:cNvSpPr>
+          <p:nvPr>
+            <p:ph type="sldNum" sz="quarter" idx="5"/>
+          </p:nvPr>
+        </p:nvSpPr>
+        <p:spPr>
+          <a:xfrm>
+            <a:off x="3884613" y="8685213"/>
+            <a:ext cx="2971800" cy="458787"/>
+          </a:xfrm>
+          <a:prstGeom prst="rect">
+            <a:avLst/>
+          </a:prstGeom>
+        </p:spPr>
+        <p:txBody>
+          <a:bodyPr vert="horz" lIns="91440" tIns="45720" rIns="91440" bIns="45720" rtlCol="0" anchor="b"/>
+          <a:lstStyle>
+            <a:lvl1pPr algn="r">
+              <a:defRPr sz="1200"/>
+            </a:lvl1pPr>
+          </a:lstStyle>
+          <a:p>
+            <a:fld id="{75D63466-9361-43DB-957E-DC07A2EF28E5}" type="slidenum">
+              <a:rPr lang="ru-RU" smtClean="0"/>
+              <a:t>‹#›</a:t>
+            </a:fld>
+            <a:endParaRPr lang="ru-RU"/>
+          </a:p>
+        </p:txBody>
+      </p:sp>
+    </p:spTree>
+    <p:extLst>
+      <p:ext uri="{BB962C8B-B14F-4D97-AF65-F5344CB8AC3E}">
+        <p14:creationId xmlns:p14="http://schemas.microsoft.com/office/powerpoint/2010/main" val="1176759080"/>
+      </p:ext>
+    </p:extLst>
+  </p:cSld>
+  <p:clrMap bg1="lt1" tx1="dk1" bg2="lt2" tx2="dk2" accent1="accent1" accent2="accent2" accent3="accent3" accent4="accent4" accent5="accent5" accent6="accent6" hlink="hlink" folHlink="folHlink"/>
+  <p:notesStyle>
+    <a:lvl1pPr marL="0" algn="l" defTabSz="914400" rtl="0" eaLnBrk="1" latinLnBrk="0" hangingPunct="1">
+      <a:defRPr sz="1200" kern="1200">
+        <a:solidFill>
+          <a:schemeClr val="tx1"/>
+        </a:solidFill>
+        <a:latin typeface="+mn-lt"/>
+        <a:ea typeface="+mn-ea"/>
+        <a:cs typeface="+mn-cs"/>
+      </a:defRPr>
+    </a:lvl1pPr>
+    <a:lvl2pPr marL="457200" algn="l" defTabSz="914400" rtl="0" eaLnBrk="1" latinLnBrk="0" hangingPunct="1">
+      <a:defRPr sz="1200" kern="1200">
+        <a:solidFill>
+          <a:schemeClr val="tx1"/>
+        </a:solidFill>
+        <a:latin typeface="+mn-lt"/>
+        <a:ea typeface="+mn-ea"/>
+        <a:cs typeface="+mn-cs"/>
+      </a:defRPr>
+    </a:lvl2pPr>
+    <a:lvl3pPr marL="914400" algn="l" defTabSz="914400" rtl="0" eaLnBrk="1" latinLnBrk="0" hangingPunct="1">
+      <a:defRPr sz="1200" kern="1200">
+        <a:solidFill>
+          <a:schemeClr val="tx1"/>
+        </a:solidFill>
+        <a:latin typeface="+mn-lt"/>
+        <a:ea typeface="+mn-ea"/>
+        <a:cs typeface="+mn-cs"/>
+      </a:defRPr>
+    </a:lvl3pPr>
+    <a:lvl4pPr marL="1371600" algn="l" defTabSz="914400" rtl="0" eaLnBrk="1" latinLnBrk="0" hangingPunct="1">
+      <a:defRPr sz="1200" kern="1200">
+        <a:solidFill>
+          <a:schemeClr val="tx1"/>
+        </a:solidFill>
+        <a:latin typeface="+mn-lt"/>
+        <a:ea typeface="+mn-ea"/>
+        <a:cs typeface="+mn-cs"/>
+      </a:defRPr>
+    </a:lvl4pPr>
+    <a:lvl5pPr marL="1828800" algn="l" defTabSz="914400" rtl="0" eaLnBrk="1" latinLnBrk="0" hangingPunct="1">
+      <a:defRPr sz="1200" kern="1200">
+        <a:solidFill>
+          <a:schemeClr val="tx1"/>
+        </a:solidFill>
+        <a:latin typeface="+mn-lt"/>
+        <a:ea typeface="+mn-ea"/>
+        <a:cs typeface="+mn-cs"/>
+      </a:defRPr>
+    </a:lvl5pPr>
+    <a:lvl6pPr marL="2286000" algn="l" defTabSz="914400" rtl="0" eaLnBrk="1" latinLnBrk="0" hangingPunct="1">
+      <a:defRPr sz="1200" kern="1200">
+        <a:solidFill>
+          <a:schemeClr val="tx1"/>
+        </a:solidFill>
+        <a:latin typeface="+mn-lt"/>
+        <a:ea typeface="+mn-ea"/>
+        <a:cs typeface="+mn-cs"/>
+      </a:defRPr>
+    </a:lvl6pPr>
+    <a:lvl7pPr marL="2743200" algn="l" defTabSz="914400" rtl="0" eaLnBrk="1" latinLnBrk="0" hangingPunct="1">
+      <a:defRPr sz="1200" kern="1200">
+        <a:solidFill>
+          <a:schemeClr val="tx1"/>
+        </a:solidFill>
+        <a:latin typeface="+mn-lt"/>
+        <a:ea typeface="+mn-ea"/>
+        <a:cs typeface="+mn-cs"/>
+      </a:defRPr>
+    </a:lvl7pPr>
+    <a:lvl8pPr marL="3200400" algn="l" defTabSz="914400" rtl="0" eaLnBrk="1" latinLnBrk="0" hangingPunct="1">
+      <a:defRPr sz="1200" kern="1200">
+        <a:solidFill>
+          <a:schemeClr val="tx1"/>
+        </a:solidFill>
+        <a:latin typeface="+mn-lt"/>
+        <a:ea typeface="+mn-ea"/>
+        <a:cs typeface="+mn-cs"/>
+      </a:defRPr>
+    </a:lvl8pPr>
+    <a:lvl9pPr marL="3657600" algn="l" defTabSz="914400" rtl="0" eaLnBrk="1" latinLnBrk="0" hangingPunct="1">
+      <a:defRPr sz="1200" kern="1200">
+        <a:solidFill>
+          <a:schemeClr val="tx1"/>
+        </a:solidFill>
+        <a:latin typeface="+mn-lt"/>
+        <a:ea typeface="+mn-ea"/>
+        <a:cs typeface="+mn-cs"/>
+      </a:defRPr>
+    </a:lvl9pPr>
+  </p:notesStyle>
+</p:notesMaster>
+</file>
+
 <file path=ppt/slideLayouts/slideLayout1.xml><?xml version="1.0" encoding="utf-8"?>
 <p:sldLayout xmlns:a="http://schemas.openxmlformats.org/drawingml/2006/main" xmlns:r="http://schemas.openxmlformats.org/officeDocument/2006/relationships" xmlns:p="http://schemas.openxmlformats.org/presentationml/2006/main" type="title" preserve="1">
   <p:cSld name="Титульный слайд">
@@ -264,9 +616,9 @@
           <a:bodyPr/>
           <a:lstStyle/>
           <a:p>
-            <a:fld id="{7180E4FB-2FC9-4BFA-B8DE-F3C32A3D4E30}" type="datetimeFigureOut">
+            <a:fld id="{1BD23597-7EE7-48F1-8BF8-6E375B91E988}" type="datetime1">
               <a:rPr lang="ru-RU" smtClean="0"/>
-              <a:t>13.12.2022</a:t>
+              <a:t>20.12.2022</a:t>
             </a:fld>
             <a:endParaRPr lang="ru-RU"/>
           </a:p>
@@ -462,9 +814,9 @@
           <a:bodyPr/>
           <a:lstStyle/>
           <a:p>
-            <a:fld id="{7180E4FB-2FC9-4BFA-B8DE-F3C32A3D4E30}" type="datetimeFigureOut">
+            <a:fld id="{C4CDE2BD-AD1F-4291-88F2-B919D162DD3D}" type="datetime1">
               <a:rPr lang="ru-RU" smtClean="0"/>
-              <a:t>13.12.2022</a:t>
+              <a:t>20.12.2022</a:t>
             </a:fld>
             <a:endParaRPr lang="ru-RU"/>
           </a:p>
@@ -670,9 +1022,9 @@
           <a:bodyPr/>
           <a:lstStyle/>
           <a:p>
-            <a:fld id="{7180E4FB-2FC9-4BFA-B8DE-F3C32A3D4E30}" type="datetimeFigureOut">
+            <a:fld id="{D39FFF6F-0CCB-45AD-B309-A353702B36CB}" type="datetime1">
               <a:rPr lang="ru-RU" smtClean="0"/>
-              <a:t>13.12.2022</a:t>
+              <a:t>20.12.2022</a:t>
             </a:fld>
             <a:endParaRPr lang="ru-RU"/>
           </a:p>
@@ -868,9 +1220,9 @@
           <a:bodyPr/>
           <a:lstStyle/>
           <a:p>
-            <a:fld id="{7180E4FB-2FC9-4BFA-B8DE-F3C32A3D4E30}" type="datetimeFigureOut">
+            <a:fld id="{8C67071C-F5B1-417C-B6D4-154737659200}" type="datetime1">
               <a:rPr lang="ru-RU" smtClean="0"/>
-              <a:t>13.12.2022</a:t>
+              <a:t>20.12.2022</a:t>
             </a:fld>
             <a:endParaRPr lang="ru-RU"/>
           </a:p>
@@ -1143,9 +1495,9 @@
           <a:bodyPr/>
           <a:lstStyle/>
           <a:p>
-            <a:fld id="{7180E4FB-2FC9-4BFA-B8DE-F3C32A3D4E30}" type="datetimeFigureOut">
+            <a:fld id="{B0B7811E-4B61-49C9-B163-92D2B3E34F71}" type="datetime1">
               <a:rPr lang="ru-RU" smtClean="0"/>
-              <a:t>13.12.2022</a:t>
+              <a:t>20.12.2022</a:t>
             </a:fld>
             <a:endParaRPr lang="ru-RU"/>
           </a:p>
@@ -1408,9 +1760,9 @@
           <a:bodyPr/>
           <a:lstStyle/>
           <a:p>
-            <a:fld id="{7180E4FB-2FC9-4BFA-B8DE-F3C32A3D4E30}" type="datetimeFigureOut">
+            <a:fld id="{182F1911-6D22-486F-86C1-100DC2970064}" type="datetime1">
               <a:rPr lang="ru-RU" smtClean="0"/>
-              <a:t>13.12.2022</a:t>
+              <a:t>20.12.2022</a:t>
             </a:fld>
             <a:endParaRPr lang="ru-RU"/>
           </a:p>
@@ -1820,9 +2172,9 @@
           <a:bodyPr/>
           <a:lstStyle/>
           <a:p>
-            <a:fld id="{7180E4FB-2FC9-4BFA-B8DE-F3C32A3D4E30}" type="datetimeFigureOut">
+            <a:fld id="{23404187-F404-40F9-A673-83E5F0C12008}" type="datetime1">
               <a:rPr lang="ru-RU" smtClean="0"/>
-              <a:t>13.12.2022</a:t>
+              <a:t>20.12.2022</a:t>
             </a:fld>
             <a:endParaRPr lang="ru-RU"/>
           </a:p>
@@ -1961,9 +2313,9 @@
           <a:bodyPr/>
           <a:lstStyle/>
           <a:p>
-            <a:fld id="{7180E4FB-2FC9-4BFA-B8DE-F3C32A3D4E30}" type="datetimeFigureOut">
+            <a:fld id="{BC6E5464-09F7-420A-A40E-11B80538160C}" type="datetime1">
               <a:rPr lang="ru-RU" smtClean="0"/>
-              <a:t>13.12.2022</a:t>
+              <a:t>20.12.2022</a:t>
             </a:fld>
             <a:endParaRPr lang="ru-RU"/>
           </a:p>
@@ -2074,9 +2426,9 @@
           <a:bodyPr/>
           <a:lstStyle/>
           <a:p>
-            <a:fld id="{7180E4FB-2FC9-4BFA-B8DE-F3C32A3D4E30}" type="datetimeFigureOut">
+            <a:fld id="{FF541F6D-BCB7-42A4-83CB-67E87B2E74CA}" type="datetime1">
               <a:rPr lang="ru-RU" smtClean="0"/>
-              <a:t>13.12.2022</a:t>
+              <a:t>20.12.2022</a:t>
             </a:fld>
             <a:endParaRPr lang="ru-RU"/>
           </a:p>
@@ -2385,9 +2737,9 @@
           <a:bodyPr/>
           <a:lstStyle/>
           <a:p>
-            <a:fld id="{7180E4FB-2FC9-4BFA-B8DE-F3C32A3D4E30}" type="datetimeFigureOut">
+            <a:fld id="{EC63A07B-5406-4104-971B-A99D5A22CDAC}" type="datetime1">
               <a:rPr lang="ru-RU" smtClean="0"/>
-              <a:t>13.12.2022</a:t>
+              <a:t>20.12.2022</a:t>
             </a:fld>
             <a:endParaRPr lang="ru-RU"/>
           </a:p>
@@ -2673,9 +3025,9 @@
           <a:bodyPr/>
           <a:lstStyle/>
           <a:p>
-            <a:fld id="{7180E4FB-2FC9-4BFA-B8DE-F3C32A3D4E30}" type="datetimeFigureOut">
+            <a:fld id="{792A69F6-C722-40EE-BBF1-849EE4AF4492}" type="datetime1">
               <a:rPr lang="ru-RU" smtClean="0"/>
-              <a:t>13.12.2022</a:t>
+              <a:t>20.12.2022</a:t>
             </a:fld>
             <a:endParaRPr lang="ru-RU"/>
           </a:p>
@@ -2934,9 +3286,9 @@
             </a:lvl1pPr>
           </a:lstStyle>
           <a:p>
-            <a:fld id="{7180E4FB-2FC9-4BFA-B8DE-F3C32A3D4E30}" type="datetimeFigureOut">
+            <a:fld id="{A95C24D1-FFBB-4266-9F44-7F33F26E68DC}" type="datetime1">
               <a:rPr lang="ru-RU" smtClean="0"/>
-              <a:t>13.12.2022</a:t>
+              <a:t>20.12.2022</a:t>
             </a:fld>
             <a:endParaRPr lang="ru-RU"/>
           </a:p>
@@ -3053,6 +3405,7 @@
     <p:sldLayoutId id="2147483658" r:id="rId10"/>
     <p:sldLayoutId id="2147483659" r:id="rId11"/>
   </p:sldLayoutIdLst>
+  <p:hf hdr="0" ftr="0" dt="0"/>
   <p:txStyles>
     <p:titleStyle>
       <a:lvl1pPr algn="l" defTabSz="914400" rtl="0" eaLnBrk="1" latinLnBrk="0" hangingPunct="1">
@@ -3672,6 +4025,35 @@
           </a:p>
         </p:txBody>
       </p:sp>
+      <p:sp>
+        <p:nvSpPr>
+          <p:cNvPr id="4" name="Номер слайда 3">
+            <a:extLst>
+              <a:ext uri="{FF2B5EF4-FFF2-40B4-BE49-F238E27FC236}">
+                <a16:creationId xmlns:a16="http://schemas.microsoft.com/office/drawing/2014/main" id="{6C5C71FB-9045-E3C7-D389-24A7EB686986}"/>
+              </a:ext>
+            </a:extLst>
+          </p:cNvPr>
+          <p:cNvSpPr>
+            <a:spLocks noGrp="1"/>
+          </p:cNvSpPr>
+          <p:nvPr>
+            <p:ph type="sldNum" sz="quarter" idx="12"/>
+          </p:nvPr>
+        </p:nvSpPr>
+        <p:spPr/>
+        <p:txBody>
+          <a:bodyPr/>
+          <a:lstStyle/>
+          <a:p>
+            <a:fld id="{A1D3546C-676A-44AE-A9E1-3A83FC1251F3}" type="slidenum">
+              <a:rPr lang="ru-RU" smtClean="0"/>
+              <a:t>2</a:t>
+            </a:fld>
+            <a:endParaRPr lang="ru-RU"/>
+          </a:p>
+        </p:txBody>
+      </p:sp>
     </p:spTree>
     <p:extLst>
       <p:ext uri="{BB962C8B-B14F-4D97-AF65-F5344CB8AC3E}">
@@ -3764,6 +4146,25 @@
               <a:t>Языки, которые поддерживают длинную арифметику</a:t>
             </a:r>
           </a:p>
+          <a:p>
+            <a:r>
+              <a:rPr lang="en-US" dirty="0"/>
+              <a:t>Python</a:t>
+            </a:r>
+          </a:p>
+          <a:p>
+            <a:r>
+              <a:rPr lang="en-US" dirty="0"/>
+              <a:t>Java</a:t>
+            </a:r>
+          </a:p>
+          <a:p>
+            <a:r>
+              <a:rPr lang="en-US" dirty="0"/>
+              <a:t>Ruby</a:t>
+            </a:r>
+            <a:endParaRPr lang="ru-RU" dirty="0"/>
+          </a:p>
         </p:txBody>
       </p:sp>
       <p:pic>
@@ -3788,7 +4189,7 @@
         </p:blipFill>
         <p:spPr>
           <a:xfrm>
-            <a:off x="6688585" y="2722817"/>
+            <a:off x="9251526" y="2938446"/>
             <a:ext cx="1378080" cy="962970"/>
           </a:xfrm>
           <a:prstGeom prst="rect">
@@ -3818,7 +4219,7 @@
         </p:blipFill>
         <p:spPr>
           <a:xfrm>
-            <a:off x="8460419" y="2983745"/>
+            <a:off x="8724900" y="3780058"/>
             <a:ext cx="791107" cy="702042"/>
           </a:xfrm>
           <a:prstGeom prst="rect">
@@ -3848,7 +4249,7 @@
         </p:blipFill>
         <p:spPr>
           <a:xfrm>
-            <a:off x="9804650" y="2822512"/>
+            <a:off x="10346188" y="2396871"/>
             <a:ext cx="1217968" cy="863275"/>
           </a:xfrm>
           <a:prstGeom prst="rect">
@@ -4055,6 +4456,35 @@
           </a:p>
         </p:txBody>
       </p:sp>
+      <p:sp>
+        <p:nvSpPr>
+          <p:cNvPr id="6" name="Номер слайда 5">
+            <a:extLst>
+              <a:ext uri="{FF2B5EF4-FFF2-40B4-BE49-F238E27FC236}">
+                <a16:creationId xmlns:a16="http://schemas.microsoft.com/office/drawing/2014/main" id="{C08A656C-C0F5-6A19-0A7B-C6EAC26694E7}"/>
+              </a:ext>
+            </a:extLst>
+          </p:cNvPr>
+          <p:cNvSpPr>
+            <a:spLocks noGrp="1"/>
+          </p:cNvSpPr>
+          <p:nvPr>
+            <p:ph type="sldNum" sz="quarter" idx="12"/>
+          </p:nvPr>
+        </p:nvSpPr>
+        <p:spPr/>
+        <p:txBody>
+          <a:bodyPr/>
+          <a:lstStyle/>
+          <a:p>
+            <a:fld id="{A1D3546C-676A-44AE-A9E1-3A83FC1251F3}" type="slidenum">
+              <a:rPr lang="ru-RU" smtClean="0"/>
+              <a:t>3</a:t>
+            </a:fld>
+            <a:endParaRPr lang="ru-RU"/>
+          </a:p>
+        </p:txBody>
+      </p:sp>
     </p:spTree>
     <p:extLst>
       <p:ext uri="{BB962C8B-B14F-4D97-AF65-F5344CB8AC3E}">
@@ -4116,89 +4546,30 @@
       </p:sp>
       <p:sp>
         <p:nvSpPr>
-          <p:cNvPr id="4" name="TextBox 3">
-            <a:extLst>
-              <a:ext uri="{FF2B5EF4-FFF2-40B4-BE49-F238E27FC236}">
-                <a16:creationId xmlns:a16="http://schemas.microsoft.com/office/drawing/2014/main" id="{41E4519E-12C5-8424-28E3-307ACADC40F8}"/>
-              </a:ext>
-            </a:extLst>
-          </p:cNvPr>
-          <p:cNvSpPr txBox="1"/>
-          <p:nvPr/>
-        </p:nvSpPr>
-        <p:spPr>
-          <a:xfrm>
-            <a:off x="683582" y="2157274"/>
-            <a:ext cx="2414726" cy="923330"/>
-          </a:xfrm>
-          <a:prstGeom prst="rect">
-            <a:avLst/>
-          </a:prstGeom>
-          <a:noFill/>
-        </p:spPr>
-        <p:txBody>
-          <a:bodyPr wrap="square" rtlCol="0">
-            <a:spAutoFit/>
-          </a:bodyPr>
-          <a:lstStyle/>
-          <a:p>
-            <a:pPr algn="r"/>
-            <a:r>
-              <a:rPr lang="ru-RU" dirty="0"/>
-              <a:t>1234567890987654321</a:t>
-            </a:r>
-            <a:endParaRPr lang="en-US" dirty="0"/>
-          </a:p>
-          <a:p>
-            <a:pPr algn="r"/>
-            <a:r>
-              <a:rPr lang="ru-RU" dirty="0"/>
-              <a:t>123456789</a:t>
-            </a:r>
-            <a:endParaRPr lang="en-US" dirty="0"/>
-          </a:p>
-          <a:p>
-            <a:pPr algn="r"/>
-            <a:r>
-              <a:rPr lang="ru-RU" dirty="0"/>
-              <a:t>1234567891111111110</a:t>
-            </a:r>
-          </a:p>
-        </p:txBody>
-      </p:sp>
-      <p:sp>
-        <p:nvSpPr>
-          <p:cNvPr id="5" name="TextBox 4">
-            <a:extLst>
-              <a:ext uri="{FF2B5EF4-FFF2-40B4-BE49-F238E27FC236}">
-                <a16:creationId xmlns:a16="http://schemas.microsoft.com/office/drawing/2014/main" id="{1CD475C0-8602-D096-14FE-B592F12EE456}"/>
-              </a:ext>
-            </a:extLst>
-          </p:cNvPr>
-          <p:cNvSpPr txBox="1"/>
-          <p:nvPr/>
-        </p:nvSpPr>
-        <p:spPr>
-          <a:xfrm>
-            <a:off x="683582" y="1576843"/>
-            <a:ext cx="2166153" cy="369332"/>
-          </a:xfrm>
-          <a:prstGeom prst="rect">
-            <a:avLst/>
-          </a:prstGeom>
-          <a:noFill/>
-        </p:spPr>
-        <p:txBody>
-          <a:bodyPr wrap="square" rtlCol="0">
-            <a:spAutoFit/>
-          </a:bodyPr>
-          <a:lstStyle/>
-          <a:p>
-            <a:pPr algn="ctr"/>
-            <a:r>
-              <a:rPr lang="ru-RU" dirty="0"/>
-              <a:t>Пример</a:t>
-            </a:r>
+          <p:cNvPr id="6" name="Номер слайда 5">
+            <a:extLst>
+              <a:ext uri="{FF2B5EF4-FFF2-40B4-BE49-F238E27FC236}">
+                <a16:creationId xmlns:a16="http://schemas.microsoft.com/office/drawing/2014/main" id="{33BAC932-8B41-0C0D-A033-F20317E7BD42}"/>
+              </a:ext>
+            </a:extLst>
+          </p:cNvPr>
+          <p:cNvSpPr>
+            <a:spLocks noGrp="1"/>
+          </p:cNvSpPr>
+          <p:nvPr>
+            <p:ph type="sldNum" sz="quarter" idx="12"/>
+          </p:nvPr>
+        </p:nvSpPr>
+        <p:spPr/>
+        <p:txBody>
+          <a:bodyPr/>
+          <a:lstStyle/>
+          <a:p>
+            <a:fld id="{A1D3546C-676A-44AE-A9E1-3A83FC1251F3}" type="slidenum">
+              <a:rPr lang="ru-RU" smtClean="0"/>
+              <a:t>4</a:t>
+            </a:fld>
+            <a:endParaRPr lang="ru-RU"/>
           </a:p>
         </p:txBody>
       </p:sp>
@@ -4263,89 +4634,30 @@
       </p:sp>
       <p:sp>
         <p:nvSpPr>
-          <p:cNvPr id="4" name="TextBox 3">
-            <a:extLst>
-              <a:ext uri="{FF2B5EF4-FFF2-40B4-BE49-F238E27FC236}">
-                <a16:creationId xmlns:a16="http://schemas.microsoft.com/office/drawing/2014/main" id="{BE6513A8-A0E0-112E-E4A4-56C7367F0DD2}"/>
-              </a:ext>
-            </a:extLst>
-          </p:cNvPr>
-          <p:cNvSpPr txBox="1"/>
-          <p:nvPr/>
-        </p:nvSpPr>
-        <p:spPr>
-          <a:xfrm>
-            <a:off x="683582" y="2157274"/>
-            <a:ext cx="2414726" cy="923330"/>
-          </a:xfrm>
-          <a:prstGeom prst="rect">
-            <a:avLst/>
-          </a:prstGeom>
-          <a:noFill/>
-        </p:spPr>
-        <p:txBody>
-          <a:bodyPr wrap="square" rtlCol="0">
-            <a:spAutoFit/>
-          </a:bodyPr>
-          <a:lstStyle/>
-          <a:p>
-            <a:pPr algn="r"/>
-            <a:r>
-              <a:rPr lang="ru-RU" dirty="0"/>
-              <a:t>1234567890987654321</a:t>
-            </a:r>
-            <a:endParaRPr lang="en-US" dirty="0"/>
-          </a:p>
-          <a:p>
-            <a:pPr algn="r"/>
-            <a:r>
-              <a:rPr lang="ru-RU" dirty="0"/>
-              <a:t>123456789</a:t>
-            </a:r>
-            <a:endParaRPr lang="en-US" dirty="0"/>
-          </a:p>
-          <a:p>
-            <a:pPr algn="r"/>
-            <a:r>
-              <a:rPr lang="ru-RU" dirty="0"/>
-              <a:t>1234567890864197532</a:t>
-            </a:r>
-          </a:p>
-        </p:txBody>
-      </p:sp>
-      <p:sp>
-        <p:nvSpPr>
-          <p:cNvPr id="5" name="TextBox 4">
-            <a:extLst>
-              <a:ext uri="{FF2B5EF4-FFF2-40B4-BE49-F238E27FC236}">
-                <a16:creationId xmlns:a16="http://schemas.microsoft.com/office/drawing/2014/main" id="{B1BF3E64-7D52-0079-06B2-F1A51D6CD0F7}"/>
-              </a:ext>
-            </a:extLst>
-          </p:cNvPr>
-          <p:cNvSpPr txBox="1"/>
-          <p:nvPr/>
-        </p:nvSpPr>
-        <p:spPr>
-          <a:xfrm>
-            <a:off x="683582" y="1576843"/>
-            <a:ext cx="2166153" cy="369332"/>
-          </a:xfrm>
-          <a:prstGeom prst="rect">
-            <a:avLst/>
-          </a:prstGeom>
-          <a:noFill/>
-        </p:spPr>
-        <p:txBody>
-          <a:bodyPr wrap="square" rtlCol="0">
-            <a:spAutoFit/>
-          </a:bodyPr>
-          <a:lstStyle/>
-          <a:p>
-            <a:pPr algn="ctr"/>
-            <a:r>
-              <a:rPr lang="ru-RU" dirty="0"/>
-              <a:t>Пример</a:t>
-            </a:r>
+          <p:cNvPr id="6" name="Номер слайда 5">
+            <a:extLst>
+              <a:ext uri="{FF2B5EF4-FFF2-40B4-BE49-F238E27FC236}">
+                <a16:creationId xmlns:a16="http://schemas.microsoft.com/office/drawing/2014/main" id="{7E55BFFB-C15B-318A-E359-645386D726E2}"/>
+              </a:ext>
+            </a:extLst>
+          </p:cNvPr>
+          <p:cNvSpPr>
+            <a:spLocks noGrp="1"/>
+          </p:cNvSpPr>
+          <p:nvPr>
+            <p:ph type="sldNum" sz="quarter" idx="12"/>
+          </p:nvPr>
+        </p:nvSpPr>
+        <p:spPr/>
+        <p:txBody>
+          <a:bodyPr/>
+          <a:lstStyle/>
+          <a:p>
+            <a:fld id="{A1D3546C-676A-44AE-A9E1-3A83FC1251F3}" type="slidenum">
+              <a:rPr lang="ru-RU" smtClean="0"/>
+              <a:t>5</a:t>
+            </a:fld>
+            <a:endParaRPr lang="ru-RU"/>
           </a:p>
         </p:txBody>
       </p:sp>
@@ -4410,92 +4722,93 @@
       </p:sp>
       <p:sp>
         <p:nvSpPr>
-          <p:cNvPr id="6" name="TextBox 5">
-            <a:extLst>
-              <a:ext uri="{FF2B5EF4-FFF2-40B4-BE49-F238E27FC236}">
-                <a16:creationId xmlns:a16="http://schemas.microsoft.com/office/drawing/2014/main" id="{C49EA5D0-4124-E541-7EB4-D7ABE58C7C83}"/>
-              </a:ext>
-            </a:extLst>
-          </p:cNvPr>
-          <p:cNvSpPr txBox="1"/>
+          <p:cNvPr id="4" name="Номер слайда 3">
+            <a:extLst>
+              <a:ext uri="{FF2B5EF4-FFF2-40B4-BE49-F238E27FC236}">
+                <a16:creationId xmlns:a16="http://schemas.microsoft.com/office/drawing/2014/main" id="{C1348F10-20A1-6333-3185-4B35ECC55F08}"/>
+              </a:ext>
+            </a:extLst>
+          </p:cNvPr>
+          <p:cNvSpPr>
+            <a:spLocks noGrp="1"/>
+          </p:cNvSpPr>
+          <p:nvPr>
+            <p:ph type="sldNum" sz="quarter" idx="12"/>
+          </p:nvPr>
+        </p:nvSpPr>
+        <p:spPr/>
+        <p:txBody>
+          <a:bodyPr/>
+          <a:lstStyle/>
+          <a:p>
+            <a:fld id="{A1D3546C-676A-44AE-A9E1-3A83FC1251F3}" type="slidenum">
+              <a:rPr lang="ru-RU" smtClean="0"/>
+              <a:t>6</a:t>
+            </a:fld>
+            <a:endParaRPr lang="ru-RU"/>
+          </a:p>
+        </p:txBody>
+      </p:sp>
+      <p:pic>
+        <p:nvPicPr>
+          <p:cNvPr id="8" name="Рисунок 7">
+            <a:extLst>
+              <a:ext uri="{FF2B5EF4-FFF2-40B4-BE49-F238E27FC236}">
+                <a16:creationId xmlns:a16="http://schemas.microsoft.com/office/drawing/2014/main" id="{0993812A-18E8-7CC8-00C0-F01A59BCB0FB}"/>
+              </a:ext>
+            </a:extLst>
+          </p:cNvPr>
+          <p:cNvPicPr>
+            <a:picLocks noChangeAspect="1"/>
+          </p:cNvPicPr>
           <p:nvPr/>
-        </p:nvSpPr>
+        </p:nvPicPr>
+        <p:blipFill>
+          <a:blip r:embed="rId2"/>
+          <a:stretch>
+            <a:fillRect/>
+          </a:stretch>
+        </p:blipFill>
         <p:spPr>
           <a:xfrm>
-            <a:off x="683581" y="2157274"/>
-            <a:ext cx="3373513" cy="923330"/>
+            <a:off x="838200" y="1439959"/>
+            <a:ext cx="4647642" cy="4695416"/>
           </a:xfrm>
           <a:prstGeom prst="rect">
             <a:avLst/>
           </a:prstGeom>
-          <a:noFill/>
         </p:spPr>
-        <p:txBody>
-          <a:bodyPr wrap="square" rtlCol="0">
-            <a:spAutoFit/>
-          </a:bodyPr>
-          <a:lstStyle/>
-          <a:p>
-            <a:pPr algn="r"/>
-            <a:r>
-              <a:rPr lang="ru-RU" dirty="0"/>
-              <a:t>1234567890987654321</a:t>
-            </a:r>
-            <a:endParaRPr lang="en-US" dirty="0"/>
-          </a:p>
-          <a:p>
-            <a:pPr algn="r"/>
-            <a:r>
-              <a:rPr lang="ru-RU" dirty="0"/>
-              <a:t>123456789</a:t>
-            </a:r>
-            <a:endParaRPr lang="en-US" dirty="0"/>
-          </a:p>
-          <a:p>
-            <a:pPr algn="r"/>
-            <a:r>
-              <a:rPr lang="ru-RU" dirty="0"/>
-              <a:t>152415787623837841112635269</a:t>
-            </a:r>
-          </a:p>
-        </p:txBody>
-      </p:sp>
-      <p:sp>
-        <p:nvSpPr>
-          <p:cNvPr id="7" name="TextBox 6">
-            <a:extLst>
-              <a:ext uri="{FF2B5EF4-FFF2-40B4-BE49-F238E27FC236}">
-                <a16:creationId xmlns:a16="http://schemas.microsoft.com/office/drawing/2014/main" id="{2B710FAC-CFB8-3C19-78B7-140984BEE6FA}"/>
-              </a:ext>
-            </a:extLst>
-          </p:cNvPr>
-          <p:cNvSpPr txBox="1"/>
+      </p:pic>
+      <p:pic>
+        <p:nvPicPr>
+          <p:cNvPr id="10" name="Рисунок 9">
+            <a:extLst>
+              <a:ext uri="{FF2B5EF4-FFF2-40B4-BE49-F238E27FC236}">
+                <a16:creationId xmlns:a16="http://schemas.microsoft.com/office/drawing/2014/main" id="{54BB45C7-3B9D-7527-BC7E-D5FBADA7082C}"/>
+              </a:ext>
+            </a:extLst>
+          </p:cNvPr>
+          <p:cNvPicPr>
+            <a:picLocks noChangeAspect="1"/>
+          </p:cNvPicPr>
           <p:nvPr/>
-        </p:nvSpPr>
+        </p:nvPicPr>
+        <p:blipFill>
+          <a:blip r:embed="rId3"/>
+          <a:stretch>
+            <a:fillRect/>
+          </a:stretch>
+        </p:blipFill>
         <p:spPr>
           <a:xfrm>
-            <a:off x="683582" y="1576843"/>
-            <a:ext cx="2166153" cy="369332"/>
+            <a:off x="6706160" y="1439959"/>
+            <a:ext cx="3945578" cy="4695416"/>
           </a:xfrm>
           <a:prstGeom prst="rect">
             <a:avLst/>
           </a:prstGeom>
-          <a:noFill/>
         </p:spPr>
-        <p:txBody>
-          <a:bodyPr wrap="square" rtlCol="0">
-            <a:spAutoFit/>
-          </a:bodyPr>
-          <a:lstStyle/>
-          <a:p>
-            <a:pPr algn="ctr"/>
-            <a:r>
-              <a:rPr lang="ru-RU" dirty="0"/>
-              <a:t>Пример</a:t>
-            </a:r>
-          </a:p>
-        </p:txBody>
-      </p:sp>
+      </p:pic>
     </p:spTree>
     <p:extLst>
       <p:ext uri="{BB962C8B-B14F-4D97-AF65-F5344CB8AC3E}">
@@ -4557,92 +4870,123 @@
       </p:sp>
       <p:sp>
         <p:nvSpPr>
-          <p:cNvPr id="4" name="TextBox 3">
-            <a:extLst>
-              <a:ext uri="{FF2B5EF4-FFF2-40B4-BE49-F238E27FC236}">
-                <a16:creationId xmlns:a16="http://schemas.microsoft.com/office/drawing/2014/main" id="{3A9C2D7B-93BC-BE0C-F49A-C2655C71D16A}"/>
-              </a:ext>
-            </a:extLst>
-          </p:cNvPr>
-          <p:cNvSpPr txBox="1"/>
+          <p:cNvPr id="6" name="Номер слайда 5">
+            <a:extLst>
+              <a:ext uri="{FF2B5EF4-FFF2-40B4-BE49-F238E27FC236}">
+                <a16:creationId xmlns:a16="http://schemas.microsoft.com/office/drawing/2014/main" id="{52B0A080-AFB4-DBD1-34F0-42869CB21629}"/>
+              </a:ext>
+            </a:extLst>
+          </p:cNvPr>
+          <p:cNvSpPr>
+            <a:spLocks noGrp="1"/>
+          </p:cNvSpPr>
+          <p:nvPr>
+            <p:ph type="sldNum" sz="quarter" idx="12"/>
+          </p:nvPr>
+        </p:nvSpPr>
+        <p:spPr/>
+        <p:txBody>
+          <a:bodyPr/>
+          <a:lstStyle/>
+          <a:p>
+            <a:fld id="{A1D3546C-676A-44AE-A9E1-3A83FC1251F3}" type="slidenum">
+              <a:rPr lang="ru-RU" smtClean="0"/>
+              <a:t>7</a:t>
+            </a:fld>
+            <a:endParaRPr lang="ru-RU"/>
+          </a:p>
+        </p:txBody>
+      </p:sp>
+      <p:pic>
+        <p:nvPicPr>
+          <p:cNvPr id="93" name="Рисунок 92">
+            <a:extLst>
+              <a:ext uri="{FF2B5EF4-FFF2-40B4-BE49-F238E27FC236}">
+                <a16:creationId xmlns:a16="http://schemas.microsoft.com/office/drawing/2014/main" id="{3F074DAF-E11C-1C4C-4A48-E522E926C0CD}"/>
+              </a:ext>
+            </a:extLst>
+          </p:cNvPr>
+          <p:cNvPicPr>
+            <a:picLocks noChangeAspect="1"/>
+          </p:cNvPicPr>
           <p:nvPr/>
-        </p:nvSpPr>
+        </p:nvPicPr>
+        <p:blipFill>
+          <a:blip r:embed="rId2"/>
+          <a:stretch>
+            <a:fillRect/>
+          </a:stretch>
+        </p:blipFill>
         <p:spPr>
           <a:xfrm>
-            <a:off x="838200" y="2271119"/>
-            <a:ext cx="2432481" cy="923330"/>
+            <a:off x="1024857" y="2903439"/>
+            <a:ext cx="2562583" cy="1514686"/>
           </a:xfrm>
           <a:prstGeom prst="rect">
             <a:avLst/>
           </a:prstGeom>
-          <a:noFill/>
         </p:spPr>
-        <p:txBody>
-          <a:bodyPr wrap="square" rtlCol="0">
-            <a:spAutoFit/>
-          </a:bodyPr>
-          <a:lstStyle/>
-          <a:p>
-            <a:pPr algn="r"/>
-            <a:r>
-              <a:rPr lang="ru-RU" dirty="0"/>
-              <a:t>1234567890987654321</a:t>
-            </a:r>
-            <a:endParaRPr lang="en-US" dirty="0"/>
-          </a:p>
-          <a:p>
-            <a:pPr algn="r"/>
-            <a:r>
-              <a:rPr lang="ru-RU" dirty="0"/>
-              <a:t>123456789</a:t>
-            </a:r>
-            <a:endParaRPr lang="en-US" dirty="0"/>
-          </a:p>
-          <a:p>
-            <a:pPr algn="r"/>
-            <a:r>
-              <a:rPr lang="ru-RU" dirty="0"/>
-              <a:t>10000000008</a:t>
-            </a:r>
-          </a:p>
-        </p:txBody>
-      </p:sp>
-      <p:sp>
-        <p:nvSpPr>
-          <p:cNvPr id="5" name="TextBox 4">
-            <a:extLst>
-              <a:ext uri="{FF2B5EF4-FFF2-40B4-BE49-F238E27FC236}">
-                <a16:creationId xmlns:a16="http://schemas.microsoft.com/office/drawing/2014/main" id="{59451D3D-55DA-F3CA-DA8D-01F0562A9AA1}"/>
-              </a:ext>
-            </a:extLst>
-          </p:cNvPr>
-          <p:cNvSpPr txBox="1"/>
+      </p:pic>
+      <p:pic>
+        <p:nvPicPr>
+          <p:cNvPr id="95" name="Рисунок 94">
+            <a:extLst>
+              <a:ext uri="{FF2B5EF4-FFF2-40B4-BE49-F238E27FC236}">
+                <a16:creationId xmlns:a16="http://schemas.microsoft.com/office/drawing/2014/main" id="{26E7A428-2D09-70F3-F835-293F0381BEF3}"/>
+              </a:ext>
+            </a:extLst>
+          </p:cNvPr>
+          <p:cNvPicPr>
+            <a:picLocks noChangeAspect="1"/>
+          </p:cNvPicPr>
           <p:nvPr/>
-        </p:nvSpPr>
+        </p:nvPicPr>
+        <p:blipFill>
+          <a:blip r:embed="rId3"/>
+          <a:stretch>
+            <a:fillRect/>
+          </a:stretch>
+        </p:blipFill>
         <p:spPr>
           <a:xfrm>
-            <a:off x="838201" y="1690688"/>
-            <a:ext cx="2166153" cy="369332"/>
+            <a:off x="4436484" y="2570016"/>
+            <a:ext cx="2705478" cy="2181529"/>
           </a:xfrm>
           <a:prstGeom prst="rect">
             <a:avLst/>
           </a:prstGeom>
-          <a:noFill/>
         </p:spPr>
-        <p:txBody>
-          <a:bodyPr wrap="square" rtlCol="0">
-            <a:spAutoFit/>
-          </a:bodyPr>
-          <a:lstStyle/>
-          <a:p>
-            <a:pPr algn="ctr"/>
-            <a:r>
-              <a:rPr lang="ru-RU" dirty="0"/>
-              <a:t>Пример</a:t>
-            </a:r>
-          </a:p>
-        </p:txBody>
-      </p:sp>
+      </p:pic>
+      <p:pic>
+        <p:nvPicPr>
+          <p:cNvPr id="97" name="Рисунок 96">
+            <a:extLst>
+              <a:ext uri="{FF2B5EF4-FFF2-40B4-BE49-F238E27FC236}">
+                <a16:creationId xmlns:a16="http://schemas.microsoft.com/office/drawing/2014/main" id="{DE7494A4-5731-D592-90A0-823148C70AC3}"/>
+              </a:ext>
+            </a:extLst>
+          </p:cNvPr>
+          <p:cNvPicPr>
+            <a:picLocks noChangeAspect="1"/>
+          </p:cNvPicPr>
+          <p:nvPr/>
+        </p:nvPicPr>
+        <p:blipFill>
+          <a:blip r:embed="rId4"/>
+          <a:stretch>
+            <a:fillRect/>
+          </a:stretch>
+        </p:blipFill>
+        <p:spPr>
+          <a:xfrm>
+            <a:off x="7991006" y="2708148"/>
+            <a:ext cx="3362794" cy="1905266"/>
+          </a:xfrm>
+          <a:prstGeom prst="rect">
+            <a:avLst/>
+          </a:prstGeom>
+        </p:spPr>
+      </p:pic>
     </p:spTree>
     <p:extLst>
       <p:ext uri="{BB962C8B-B14F-4D97-AF65-F5344CB8AC3E}">
@@ -4723,6 +5067,35 @@
           <a:bodyPr/>
           <a:lstStyle/>
           <a:p>
+            <a:endParaRPr lang="ru-RU"/>
+          </a:p>
+        </p:txBody>
+      </p:sp>
+      <p:sp>
+        <p:nvSpPr>
+          <p:cNvPr id="5" name="Номер слайда 4">
+            <a:extLst>
+              <a:ext uri="{FF2B5EF4-FFF2-40B4-BE49-F238E27FC236}">
+                <a16:creationId xmlns:a16="http://schemas.microsoft.com/office/drawing/2014/main" id="{85EC9D3B-9194-BE21-F364-39EF273179EA}"/>
+              </a:ext>
+            </a:extLst>
+          </p:cNvPr>
+          <p:cNvSpPr>
+            <a:spLocks noGrp="1"/>
+          </p:cNvSpPr>
+          <p:nvPr>
+            <p:ph type="sldNum" sz="quarter" idx="12"/>
+          </p:nvPr>
+        </p:nvSpPr>
+        <p:spPr/>
+        <p:txBody>
+          <a:bodyPr/>
+          <a:lstStyle/>
+          <a:p>
+            <a:fld id="{A1D3546C-676A-44AE-A9E1-3A83FC1251F3}" type="slidenum">
+              <a:rPr lang="ru-RU" smtClean="0"/>
+              <a:t>8</a:t>
+            </a:fld>
             <a:endParaRPr lang="ru-RU"/>
           </a:p>
         </p:txBody>
@@ -5033,4 +5406,299 @@
     </a:ext>
   </a:extLst>
 </a:theme>
+</file>
+
+<file path=ppt/theme/theme2.xml><?xml version="1.0" encoding="utf-8"?>
+<a:theme xmlns:a="http://schemas.openxmlformats.org/drawingml/2006/main" name="Тема Office">
+  <a:themeElements>
+    <a:clrScheme name="Стандартная">
+      <a:dk1>
+        <a:sysClr val="windowText" lastClr="000000"/>
+      </a:dk1>
+      <a:lt1>
+        <a:sysClr val="window" lastClr="FFFFFF"/>
+      </a:lt1>
+      <a:dk2>
+        <a:srgbClr val="44546A"/>
+      </a:dk2>
+      <a:lt2>
+        <a:srgbClr val="E7E6E6"/>
+      </a:lt2>
+      <a:accent1>
+        <a:srgbClr val="4472C4"/>
+      </a:accent1>
+      <a:accent2>
+        <a:srgbClr val="ED7D31"/>
+      </a:accent2>
+      <a:accent3>
+        <a:srgbClr val="A5A5A5"/>
+      </a:accent3>
+      <a:accent4>
+        <a:srgbClr val="FFC000"/>
+      </a:accent4>
+      <a:accent5>
+        <a:srgbClr val="5B9BD5"/>
+      </a:accent5>
+      <a:accent6>
+        <a:srgbClr val="70AD47"/>
+      </a:accent6>
+      <a:hlink>
+        <a:srgbClr val="0563C1"/>
+      </a:hlink>
+      <a:folHlink>
+        <a:srgbClr val="954F72"/>
+      </a:folHlink>
+    </a:clrScheme>
+    <a:fontScheme name="Стандартная">
+      <a:majorFont>
+        <a:latin typeface="Calibri Light" panose="020F0302020204030204"/>
+        <a:ea typeface=""/>
+        <a:cs typeface=""/>
+        <a:font script="Jpan" typeface="游ゴシック Light"/>
+        <a:font script="Hang" typeface="맑은 고딕"/>
+        <a:font script="Hans" typeface="等线 Light"/>
+        <a:font script="Hant" typeface="新細明體"/>
+        <a:font script="Arab" typeface="Times New Roman"/>
+        <a:font script="Hebr" typeface="Times New Roman"/>
+        <a:font script="Thai" typeface="Angsana New"/>
+        <a:font script="Ethi" typeface="Nyala"/>
+        <a:font script="Beng" typeface="Vrinda"/>
+        <a:font script="Gujr" typeface="Shruti"/>
+        <a:font script="Khmr" typeface="MoolBoran"/>
+        <a:font script="Knda" typeface="Tunga"/>
+        <a:font script="Guru" typeface="Raavi"/>
+        <a:font script="Cans" typeface="Euphemia"/>
+        <a:font script="Cher" typeface="Plantagenet Cherokee"/>
+        <a:font script="Yiii" typeface="Microsoft Yi Baiti"/>
+        <a:font script="Tibt" typeface="Microsoft Himalaya"/>
+        <a:font script="Thaa" typeface="MV Boli"/>
+        <a:font script="Deva" typeface="Mangal"/>
+        <a:font script="Telu" typeface="Gautami"/>
+        <a:font script="Taml" typeface="Latha"/>
+        <a:font script="Syrc" typeface="Estrangelo Edessa"/>
+        <a:font script="Orya" typeface="Kalinga"/>
+        <a:font script="Mlym" typeface="Kartika"/>
+        <a:font script="Laoo" typeface="DokChampa"/>
+        <a:font script="Sinh" typeface="Iskoola Pota"/>
+        <a:font script="Mong" typeface="Mongolian Baiti"/>
+        <a:font script="Viet" typeface="Times New Roman"/>
+        <a:font script="Uigh" typeface="Microsoft Uighur"/>
+        <a:font script="Geor" typeface="Sylfaen"/>
+        <a:font script="Armn" typeface="Arial"/>
+        <a:font script="Bugi" typeface="Leelawadee UI"/>
+        <a:font script="Bopo" typeface="Microsoft JhengHei"/>
+        <a:font script="Java" typeface="Javanese Text"/>
+        <a:font script="Lisu" typeface="Segoe UI"/>
+        <a:font script="Mymr" typeface="Myanmar Text"/>
+        <a:font script="Nkoo" typeface="Ebrima"/>
+        <a:font script="Olck" typeface="Nirmala UI"/>
+        <a:font script="Osma" typeface="Ebrima"/>
+        <a:font script="Phag" typeface="Phagspa"/>
+        <a:font script="Syrn" typeface="Estrangelo Edessa"/>
+        <a:font script="Syrj" typeface="Estrangelo Edessa"/>
+        <a:font script="Syre" typeface="Estrangelo Edessa"/>
+        <a:font script="Sora" typeface="Nirmala UI"/>
+        <a:font script="Tale" typeface="Microsoft Tai Le"/>
+        <a:font script="Talu" typeface="Microsoft New Tai Lue"/>
+        <a:font script="Tfng" typeface="Ebrima"/>
+      </a:majorFont>
+      <a:minorFont>
+        <a:latin typeface="Calibri" panose="020F0502020204030204"/>
+        <a:ea typeface=""/>
+        <a:cs typeface=""/>
+        <a:font script="Jpan" typeface="游ゴシック"/>
+        <a:font script="Hang" typeface="맑은 고딕"/>
+        <a:font script="Hans" typeface="等线"/>
+        <a:font script="Hant" typeface="新細明體"/>
+        <a:font script="Arab" typeface="Arial"/>
+        <a:font script="Hebr" typeface="Arial"/>
+        <a:font script="Thai" typeface="Cordia New"/>
+        <a:font script="Ethi" typeface="Nyala"/>
+        <a:font script="Beng" typeface="Vrinda"/>
+        <a:font script="Gujr" typeface="Shruti"/>
+        <a:font script="Khmr" typeface="DaunPenh"/>
+        <a:font script="Knda" typeface="Tunga"/>
+        <a:font script="Guru" typeface="Raavi"/>
+        <a:font script="Cans" typeface="Euphemia"/>
+        <a:font script="Cher" typeface="Plantagenet Cherokee"/>
+        <a:font script="Yiii" typeface="Microsoft Yi Baiti"/>
+        <a:font script="Tibt" typeface="Microsoft Himalaya"/>
+        <a:font script="Thaa" typeface="MV Boli"/>
+        <a:font script="Deva" typeface="Mangal"/>
+        <a:font script="Telu" typeface="Gautami"/>
+        <a:font script="Taml" typeface="Latha"/>
+        <a:font script="Syrc" typeface="Estrangelo Edessa"/>
+        <a:font script="Orya" typeface="Kalinga"/>
+        <a:font script="Mlym" typeface="Kartika"/>
+        <a:font script="Laoo" typeface="DokChampa"/>
+        <a:font script="Sinh" typeface="Iskoola Pota"/>
+        <a:font script="Mong" typeface="Mongolian Baiti"/>
+        <a:font script="Viet" typeface="Arial"/>
+        <a:font script="Uigh" typeface="Microsoft Uighur"/>
+        <a:font script="Geor" typeface="Sylfaen"/>
+        <a:font script="Armn" typeface="Arial"/>
+        <a:font script="Bugi" typeface="Leelawadee UI"/>
+        <a:font script="Bopo" typeface="Microsoft JhengHei"/>
+        <a:font script="Java" typeface="Javanese Text"/>
+        <a:font script="Lisu" typeface="Segoe UI"/>
+        <a:font script="Mymr" typeface="Myanmar Text"/>
+        <a:font script="Nkoo" typeface="Ebrima"/>
+        <a:font script="Olck" typeface="Nirmala UI"/>
+        <a:font script="Osma" typeface="Ebrima"/>
+        <a:font script="Phag" typeface="Phagspa"/>
+        <a:font script="Syrn" typeface="Estrangelo Edessa"/>
+        <a:font script="Syrj" typeface="Estrangelo Edessa"/>
+        <a:font script="Syre" typeface="Estrangelo Edessa"/>
+        <a:font script="Sora" typeface="Nirmala UI"/>
+        <a:font script="Tale" typeface="Microsoft Tai Le"/>
+        <a:font script="Talu" typeface="Microsoft New Tai Lue"/>
+        <a:font script="Tfng" typeface="Ebrima"/>
+      </a:minorFont>
+    </a:fontScheme>
+    <a:fmtScheme name="Стандартная">
+      <a:fillStyleLst>
+        <a:solidFill>
+          <a:schemeClr val="phClr"/>
+        </a:solidFill>
+        <a:gradFill rotWithShape="1">
+          <a:gsLst>
+            <a:gs pos="0">
+              <a:schemeClr val="phClr">
+                <a:lumMod val="110000"/>
+                <a:satMod val="105000"/>
+                <a:tint val="67000"/>
+              </a:schemeClr>
+            </a:gs>
+            <a:gs pos="50000">
+              <a:schemeClr val="phClr">
+                <a:lumMod val="105000"/>
+                <a:satMod val="103000"/>
+                <a:tint val="73000"/>
+              </a:schemeClr>
+            </a:gs>
+            <a:gs pos="100000">
+              <a:schemeClr val="phClr">
+                <a:lumMod val="105000"/>
+                <a:satMod val="109000"/>
+                <a:tint val="81000"/>
+              </a:schemeClr>
+            </a:gs>
+          </a:gsLst>
+          <a:lin ang="5400000" scaled="0"/>
+        </a:gradFill>
+        <a:gradFill rotWithShape="1">
+          <a:gsLst>
+            <a:gs pos="0">
+              <a:schemeClr val="phClr">
+                <a:satMod val="103000"/>
+                <a:lumMod val="102000"/>
+                <a:tint val="94000"/>
+              </a:schemeClr>
+            </a:gs>
+            <a:gs pos="50000">
+              <a:schemeClr val="phClr">
+                <a:satMod val="110000"/>
+                <a:lumMod val="100000"/>
+                <a:shade val="100000"/>
+              </a:schemeClr>
+            </a:gs>
+            <a:gs pos="100000">
+              <a:schemeClr val="phClr">
+                <a:lumMod val="99000"/>
+                <a:satMod val="120000"/>
+                <a:shade val="78000"/>
+              </a:schemeClr>
+            </a:gs>
+          </a:gsLst>
+          <a:lin ang="5400000" scaled="0"/>
+        </a:gradFill>
+      </a:fillStyleLst>
+      <a:lnStyleLst>
+        <a:ln w="6350" cap="flat" cmpd="sng" algn="ctr">
+          <a:solidFill>
+            <a:schemeClr val="phClr"/>
+          </a:solidFill>
+          <a:prstDash val="solid"/>
+          <a:miter lim="800000"/>
+        </a:ln>
+        <a:ln w="12700" cap="flat" cmpd="sng" algn="ctr">
+          <a:solidFill>
+            <a:schemeClr val="phClr"/>
+          </a:solidFill>
+          <a:prstDash val="solid"/>
+          <a:miter lim="800000"/>
+        </a:ln>
+        <a:ln w="19050" cap="flat" cmpd="sng" algn="ctr">
+          <a:solidFill>
+            <a:schemeClr val="phClr"/>
+          </a:solidFill>
+          <a:prstDash val="solid"/>
+          <a:miter lim="800000"/>
+        </a:ln>
+      </a:lnStyleLst>
+      <a:effectStyleLst>
+        <a:effectStyle>
+          <a:effectLst/>
+        </a:effectStyle>
+        <a:effectStyle>
+          <a:effectLst/>
+        </a:effectStyle>
+        <a:effectStyle>
+          <a:effectLst>
+            <a:outerShdw blurRad="57150" dist="19050" dir="5400000" algn="ctr" rotWithShape="0">
+              <a:srgbClr val="000000">
+                <a:alpha val="63000"/>
+              </a:srgbClr>
+            </a:outerShdw>
+          </a:effectLst>
+        </a:effectStyle>
+      </a:effectStyleLst>
+      <a:bgFillStyleLst>
+        <a:solidFill>
+          <a:schemeClr val="phClr"/>
+        </a:solidFill>
+        <a:solidFill>
+          <a:schemeClr val="phClr">
+            <a:tint val="95000"/>
+            <a:satMod val="170000"/>
+          </a:schemeClr>
+        </a:solidFill>
+        <a:gradFill rotWithShape="1">
+          <a:gsLst>
+            <a:gs pos="0">
+              <a:schemeClr val="phClr">
+                <a:tint val="93000"/>
+                <a:satMod val="150000"/>
+                <a:shade val="98000"/>
+                <a:lumMod val="102000"/>
+              </a:schemeClr>
+            </a:gs>
+            <a:gs pos="50000">
+              <a:schemeClr val="phClr">
+                <a:tint val="98000"/>
+                <a:satMod val="130000"/>
+                <a:shade val="90000"/>
+                <a:lumMod val="103000"/>
+              </a:schemeClr>
+            </a:gs>
+            <a:gs pos="100000">
+              <a:schemeClr val="phClr">
+                <a:shade val="63000"/>
+                <a:satMod val="120000"/>
+              </a:schemeClr>
+            </a:gs>
+          </a:gsLst>
+          <a:lin ang="5400000" scaled="0"/>
+        </a:gradFill>
+      </a:bgFillStyleLst>
+    </a:fmtScheme>
+  </a:themeElements>
+  <a:objectDefaults/>
+  <a:extraClrSchemeLst/>
+  <a:extLst>
+    <a:ext uri="{05A4C25C-085E-4340-85A3-A5531E510DB2}">
+      <thm15:themeFamily xmlns:thm15="http://schemas.microsoft.com/office/thememl/2012/main" name="Office Theme" id="{62F939B6-93AF-4DB8-9C6B-D6C7DFDC589F}" vid="{4A3C46E8-61CC-4603-A589-7422A47A8E4A}"/>
+    </a:ext>
+  </a:extLst>
+</a:theme>
 </file>
</xml_diff>

<commit_message>
report, powerpoint - update
</commit_message>
<xml_diff>
--- a/Длинная арифметика.pptx
+++ b/Длинная арифметика.pptx
@@ -4573,6 +4573,66 @@
           </a:p>
         </p:txBody>
       </p:sp>
+      <p:pic>
+        <p:nvPicPr>
+          <p:cNvPr id="4" name="Рисунок 3">
+            <a:extLst>
+              <a:ext uri="{FF2B5EF4-FFF2-40B4-BE49-F238E27FC236}">
+                <a16:creationId xmlns:a16="http://schemas.microsoft.com/office/drawing/2014/main" id="{0E1B5160-7C9C-9725-2033-344EC89C3966}"/>
+              </a:ext>
+            </a:extLst>
+          </p:cNvPr>
+          <p:cNvPicPr>
+            <a:picLocks noChangeAspect="1"/>
+          </p:cNvPicPr>
+          <p:nvPr/>
+        </p:nvPicPr>
+        <p:blipFill>
+          <a:blip r:embed="rId2"/>
+          <a:stretch>
+            <a:fillRect/>
+          </a:stretch>
+        </p:blipFill>
+        <p:spPr>
+          <a:xfrm>
+            <a:off x="1016070" y="1499480"/>
+            <a:ext cx="5837312" cy="4993395"/>
+          </a:xfrm>
+          <a:prstGeom prst="rect">
+            <a:avLst/>
+          </a:prstGeom>
+        </p:spPr>
+      </p:pic>
+      <p:pic>
+        <p:nvPicPr>
+          <p:cNvPr id="7" name="Рисунок 6">
+            <a:extLst>
+              <a:ext uri="{FF2B5EF4-FFF2-40B4-BE49-F238E27FC236}">
+                <a16:creationId xmlns:a16="http://schemas.microsoft.com/office/drawing/2014/main" id="{80621D70-6510-BCF4-5579-07135050525F}"/>
+              </a:ext>
+            </a:extLst>
+          </p:cNvPr>
+          <p:cNvPicPr>
+            <a:picLocks noChangeAspect="1"/>
+          </p:cNvPicPr>
+          <p:nvPr/>
+        </p:nvPicPr>
+        <p:blipFill>
+          <a:blip r:embed="rId3"/>
+          <a:stretch>
+            <a:fillRect/>
+          </a:stretch>
+        </p:blipFill>
+        <p:spPr>
+          <a:xfrm>
+            <a:off x="7500004" y="1499480"/>
+            <a:ext cx="3029373" cy="4991797"/>
+          </a:xfrm>
+          <a:prstGeom prst="rect">
+            <a:avLst/>
+          </a:prstGeom>
+        </p:spPr>
+      </p:pic>
     </p:spTree>
     <p:extLst>
       <p:ext uri="{BB962C8B-B14F-4D97-AF65-F5344CB8AC3E}">
@@ -4661,6 +4721,96 @@
           </a:p>
         </p:txBody>
       </p:sp>
+      <p:pic>
+        <p:nvPicPr>
+          <p:cNvPr id="7" name="Рисунок 6">
+            <a:extLst>
+              <a:ext uri="{FF2B5EF4-FFF2-40B4-BE49-F238E27FC236}">
+                <a16:creationId xmlns:a16="http://schemas.microsoft.com/office/drawing/2014/main" id="{CDCFBEA6-46B3-3112-8059-DFEF581DE777}"/>
+              </a:ext>
+            </a:extLst>
+          </p:cNvPr>
+          <p:cNvPicPr>
+            <a:picLocks noChangeAspect="1"/>
+          </p:cNvPicPr>
+          <p:nvPr/>
+        </p:nvPicPr>
+        <p:blipFill>
+          <a:blip r:embed="rId2"/>
+          <a:stretch>
+            <a:fillRect/>
+          </a:stretch>
+        </p:blipFill>
+        <p:spPr>
+          <a:xfrm>
+            <a:off x="8359410" y="1857549"/>
+            <a:ext cx="2886113" cy="3777758"/>
+          </a:xfrm>
+          <a:prstGeom prst="rect">
+            <a:avLst/>
+          </a:prstGeom>
+        </p:spPr>
+      </p:pic>
+      <p:pic>
+        <p:nvPicPr>
+          <p:cNvPr id="9" name="Рисунок 8">
+            <a:extLst>
+              <a:ext uri="{FF2B5EF4-FFF2-40B4-BE49-F238E27FC236}">
+                <a16:creationId xmlns:a16="http://schemas.microsoft.com/office/drawing/2014/main" id="{79054F7E-5605-0FCC-C25A-FFC9C71F5E0C}"/>
+              </a:ext>
+            </a:extLst>
+          </p:cNvPr>
+          <p:cNvPicPr>
+            <a:picLocks noChangeAspect="1"/>
+          </p:cNvPicPr>
+          <p:nvPr/>
+        </p:nvPicPr>
+        <p:blipFill>
+          <a:blip r:embed="rId3"/>
+          <a:stretch>
+            <a:fillRect/>
+          </a:stretch>
+        </p:blipFill>
+        <p:spPr>
+          <a:xfrm>
+            <a:off x="463634" y="1027906"/>
+            <a:ext cx="2915057" cy="3896269"/>
+          </a:xfrm>
+          <a:prstGeom prst="rect">
+            <a:avLst/>
+          </a:prstGeom>
+        </p:spPr>
+      </p:pic>
+      <p:pic>
+        <p:nvPicPr>
+          <p:cNvPr id="11" name="Рисунок 10">
+            <a:extLst>
+              <a:ext uri="{FF2B5EF4-FFF2-40B4-BE49-F238E27FC236}">
+                <a16:creationId xmlns:a16="http://schemas.microsoft.com/office/drawing/2014/main" id="{5448178A-49EA-10A0-04C3-FCD81E035EBE}"/>
+              </a:ext>
+            </a:extLst>
+          </p:cNvPr>
+          <p:cNvPicPr>
+            <a:picLocks noChangeAspect="1"/>
+          </p:cNvPicPr>
+          <p:nvPr/>
+        </p:nvPicPr>
+        <p:blipFill>
+          <a:blip r:embed="rId4"/>
+          <a:stretch>
+            <a:fillRect/>
+          </a:stretch>
+        </p:blipFill>
+        <p:spPr>
+          <a:xfrm>
+            <a:off x="3283126" y="2976040"/>
+            <a:ext cx="3667637" cy="3315163"/>
+          </a:xfrm>
+          <a:prstGeom prst="rect">
+            <a:avLst/>
+          </a:prstGeom>
+        </p:spPr>
+      </p:pic>
     </p:spTree>
     <p:extLst>
       <p:ext uri="{BB962C8B-B14F-4D97-AF65-F5344CB8AC3E}">

</xml_diff>